<commit_message>
mobile design exercise updated
</commit_message>
<xml_diff>
--- a/Mobile Programming and Multimedia/Exercises/2023-2024/Exercise-2/Amista_Sanson_Mobile_Design.pptx
+++ b/Mobile Programming and Multimedia/Exercises/2023-2024/Exercise-2/Amista_Sanson_Mobile_Design.pptx
@@ -242,7 +242,7 @@
             <a:pPr rtl="0"/>
             <a:fld id="{DBC54730-5EBA-4920-A6C4-7F8458A7F940}" type="datetime1">
               <a:rPr lang="it-IT" smtClean="0"/>
-              <a:t>21/04/2024</a:t>
+              <a:t>28/04/2024</a:t>
             </a:fld>
             <a:endParaRPr lang="it-IT"/>
           </a:p>
@@ -424,7 +424,7 @@
             <a:fld id="{85EC1C34-318D-43A8-83F5-3AC8647FE75E}" type="datetime1">
               <a:rPr lang="it-IT" smtClean="0"/>
               <a:pPr/>
-              <a:t>21/04/2024</a:t>
+              <a:t>28/04/2024</a:t>
             </a:fld>
             <a:endParaRPr lang="it-IT" dirty="0"/>
           </a:p>
@@ -16301,7 +16301,11 @@
           </a:bodyPr>
           <a:lstStyle/>
           <a:p>
-            <a:pPr rtl="0"/>
+            <a:pPr rtl="0">
+              <a:spcBef>
+                <a:spcPts val="0"/>
+              </a:spcBef>
+            </a:pPr>
             <a:r>
               <a:rPr lang="it-IT" sz="4000" b="1" dirty="0">
                 <a:latin typeface="+mn-lt"/>
@@ -16415,7 +16419,7 @@
         </p:blipFill>
         <p:spPr bwMode="auto">
           <a:xfrm>
-            <a:off x="466233" y="485120"/>
+            <a:off x="564556" y="485120"/>
             <a:ext cx="3171825" cy="1433593"/>
           </a:xfrm>
           <a:prstGeom prst="rect">
@@ -16580,7 +16584,7 @@
         <p:spPr>
           <a:xfrm>
             <a:off x="644362" y="990476"/>
-            <a:ext cx="3258335" cy="5386090"/>
+            <a:ext cx="3258335" cy="5622052"/>
           </a:xfrm>
           <a:prstGeom prst="rect">
             <a:avLst/>
@@ -16595,7 +16599,7 @@
           <a:p>
             <a:pPr>
               <a:spcAft>
-                <a:spcPts val="300"/>
+                <a:spcPts val="800"/>
               </a:spcAft>
             </a:pPr>
             <a:r>
@@ -16606,7 +16610,7 @@
           <a:p>
             <a:pPr marL="285750" indent="-285750">
               <a:spcAft>
-                <a:spcPts val="300"/>
+                <a:spcPts val="800"/>
               </a:spcAft>
               <a:buFontTx/>
               <a:buChar char="-"/>
@@ -16619,7 +16623,7 @@
           <a:p>
             <a:pPr marL="285750" indent="-285750">
               <a:spcAft>
-                <a:spcPts val="300"/>
+                <a:spcPts val="800"/>
               </a:spcAft>
               <a:buFontTx/>
               <a:buChar char="-"/>
@@ -16632,7 +16636,7 @@
           <a:p>
             <a:pPr marL="285750" indent="-285750">
               <a:spcAft>
-                <a:spcPts val="300"/>
+                <a:spcPts val="800"/>
               </a:spcAft>
               <a:buFontTx/>
               <a:buChar char="-"/>
@@ -16662,7 +16666,7 @@
           <a:p>
             <a:pPr>
               <a:spcAft>
-                <a:spcPts val="300"/>
+                <a:spcPts val="800"/>
               </a:spcAft>
             </a:pPr>
             <a:r>
@@ -16673,7 +16677,7 @@
           <a:p>
             <a:pPr marL="285750" indent="-285750">
               <a:spcAft>
-                <a:spcPts val="300"/>
+                <a:spcPts val="800"/>
               </a:spcAft>
               <a:buFontTx/>
               <a:buChar char="-"/>
@@ -16686,7 +16690,7 @@
           <a:p>
             <a:pPr marL="285750" indent="-285750">
               <a:spcAft>
-                <a:spcPts val="300"/>
+                <a:spcPts val="800"/>
               </a:spcAft>
               <a:buFontTx/>
               <a:buChar char="-"/>
@@ -16699,7 +16703,7 @@
           <a:p>
             <a:pPr marL="285750" indent="-285750">
               <a:spcAft>
-                <a:spcPts val="300"/>
+                <a:spcPts val="800"/>
               </a:spcAft>
               <a:buFontTx/>
               <a:buChar char="-"/>
@@ -16718,13 +16722,6 @@
               <a:rPr lang="en-GB" dirty="0"/>
               <a:t>move dangerous operations outside the comfort zone</a:t>
             </a:r>
-          </a:p>
-          <a:p>
-            <a:pPr marL="285750" indent="-285750">
-              <a:buFontTx/>
-              <a:buChar char="-"/>
-            </a:pPr>
-            <a:endParaRPr lang="en-GB" dirty="0"/>
           </a:p>
           <a:p>
             <a:endParaRPr lang="en-GB" dirty="0"/>
@@ -16866,7 +16863,7 @@
           <a:p>
             <a:r>
               <a:rPr lang="it-IT" sz="3200" b="1" dirty="0"/>
-              <a:t>POSITIVE DESIGN: APP_NAME</a:t>
+              <a:t>POSITIVE DESIGN: TAPO</a:t>
             </a:r>
             <a:endParaRPr lang="it-IT" sz="3200" dirty="0"/>
           </a:p>
@@ -16887,7 +16884,7 @@
         <p:spPr>
           <a:xfrm>
             <a:off x="644362" y="990476"/>
-            <a:ext cx="3258335" cy="1277273"/>
+            <a:ext cx="3258335" cy="2100575"/>
           </a:xfrm>
           <a:prstGeom prst="rect">
             <a:avLst/>
@@ -16902,12 +16899,38 @@
           <a:p>
             <a:pPr>
               <a:spcAft>
-                <a:spcPts val="300"/>
+                <a:spcPts val="800"/>
               </a:spcAft>
             </a:pPr>
             <a:r>
               <a:rPr lang="en-GB" dirty="0"/>
               <a:t>Positive aspects:</a:t>
+            </a:r>
+          </a:p>
+          <a:p>
+            <a:pPr marL="285750" indent="-285750">
+              <a:spcAft>
+                <a:spcPts val="800"/>
+              </a:spcAft>
+              <a:buFontTx/>
+              <a:buChar char="-"/>
+            </a:pPr>
+            <a:r>
+              <a:rPr lang="en-GB" dirty="0"/>
+              <a:t>Follows the principle: “content on top”</a:t>
+            </a:r>
+          </a:p>
+          <a:p>
+            <a:pPr marL="285750" indent="-285750">
+              <a:spcAft>
+                <a:spcPts val="800"/>
+              </a:spcAft>
+              <a:buFontTx/>
+              <a:buChar char="-"/>
+            </a:pPr>
+            <a:r>
+              <a:rPr lang="en-GB" dirty="0"/>
+              <a:t>Just-in-time interfaces</a:t>
             </a:r>
           </a:p>
           <a:p>
@@ -16920,21 +16943,177 @@
             </a:pPr>
             <a:r>
               <a:rPr lang="en-GB" dirty="0"/>
-              <a:t>…</a:t>
+              <a:t>Gestures</a:t>
             </a:r>
           </a:p>
           <a:p>
             <a:pPr marL="285750" indent="-285750">
+              <a:spcAft>
+                <a:spcPts val="300"/>
+              </a:spcAft>
               <a:buFontTx/>
               <a:buChar char="-"/>
             </a:pPr>
             <a:endParaRPr lang="en-GB" dirty="0"/>
           </a:p>
-          <a:p>
-            <a:endParaRPr lang="en-GB" dirty="0"/>
-          </a:p>
-        </p:txBody>
-      </p:sp>
+        </p:txBody>
+      </p:sp>
+      <p:pic>
+        <p:nvPicPr>
+          <p:cNvPr id="2" name="Picture 2">
+            <a:extLst>
+              <a:ext uri="{FF2B5EF4-FFF2-40B4-BE49-F238E27FC236}">
+                <a16:creationId xmlns:a16="http://schemas.microsoft.com/office/drawing/2014/main" id="{6AB7C713-EF7B-E38D-1B62-84AF899D4621}"/>
+              </a:ext>
+            </a:extLst>
+          </p:cNvPr>
+          <p:cNvPicPr>
+            <a:picLocks noChangeAspect="1" noChangeArrowheads="1"/>
+          </p:cNvPicPr>
+          <p:nvPr/>
+        </p:nvPicPr>
+        <p:blipFill>
+          <a:blip r:embed="rId3">
+            <a:extLst>
+              <a:ext uri="{28A0092B-C50C-407E-A947-70E740481C1C}">
+                <a14:useLocalDpi xmlns:a14="http://schemas.microsoft.com/office/drawing/2010/main" val="0"/>
+              </a:ext>
+            </a:extLst>
+          </a:blip>
+          <a:srcRect/>
+          <a:stretch>
+            <a:fillRect/>
+          </a:stretch>
+        </p:blipFill>
+        <p:spPr bwMode="auto">
+          <a:xfrm>
+            <a:off x="3691647" y="1121258"/>
+            <a:ext cx="2306029" cy="5124509"/>
+          </a:xfrm>
+          <a:prstGeom prst="rect">
+            <a:avLst/>
+          </a:prstGeom>
+          <a:noFill/>
+          <a:ln>
+            <a:solidFill>
+              <a:schemeClr val="tx1"/>
+            </a:solidFill>
+          </a:ln>
+          <a:extLst>
+            <a:ext uri="{909E8E84-426E-40DD-AFC4-6F175D3DCCD1}">
+              <a14:hiddenFill xmlns:a14="http://schemas.microsoft.com/office/drawing/2010/main">
+                <a:solidFill>
+                  <a:srgbClr val="FFFFFF"/>
+                </a:solidFill>
+              </a14:hiddenFill>
+            </a:ext>
+          </a:extLst>
+        </p:spPr>
+      </p:pic>
+      <p:pic>
+        <p:nvPicPr>
+          <p:cNvPr id="1028" name="Picture 4">
+            <a:extLst>
+              <a:ext uri="{FF2B5EF4-FFF2-40B4-BE49-F238E27FC236}">
+                <a16:creationId xmlns:a16="http://schemas.microsoft.com/office/drawing/2014/main" id="{B7317821-228B-4B44-D2EF-8E02A7538A73}"/>
+              </a:ext>
+            </a:extLst>
+          </p:cNvPr>
+          <p:cNvPicPr>
+            <a:picLocks noChangeAspect="1" noChangeArrowheads="1"/>
+          </p:cNvPicPr>
+          <p:nvPr/>
+        </p:nvPicPr>
+        <p:blipFill>
+          <a:blip r:embed="rId4">
+            <a:extLst>
+              <a:ext uri="{28A0092B-C50C-407E-A947-70E740481C1C}">
+                <a14:useLocalDpi xmlns:a14="http://schemas.microsoft.com/office/drawing/2010/main" val="0"/>
+              </a:ext>
+            </a:extLst>
+          </a:blip>
+          <a:srcRect/>
+          <a:stretch>
+            <a:fillRect/>
+          </a:stretch>
+        </p:blipFill>
+        <p:spPr bwMode="auto">
+          <a:xfrm>
+            <a:off x="6532455" y="1121258"/>
+            <a:ext cx="2306029" cy="5124509"/>
+          </a:xfrm>
+          <a:prstGeom prst="rect">
+            <a:avLst/>
+          </a:prstGeom>
+          <a:noFill/>
+          <a:ln>
+            <a:solidFill>
+              <a:schemeClr val="tx1"/>
+            </a:solidFill>
+          </a:ln>
+          <a:extLst>
+            <a:ext uri="{909E8E84-426E-40DD-AFC4-6F175D3DCCD1}">
+              <a14:hiddenFill xmlns:a14="http://schemas.microsoft.com/office/drawing/2010/main">
+                <a:solidFill>
+                  <a:srgbClr val="FFFFFF"/>
+                </a:solidFill>
+              </a14:hiddenFill>
+            </a:ext>
+          </a:extLst>
+        </p:spPr>
+      </p:pic>
+      <p:pic>
+        <p:nvPicPr>
+          <p:cNvPr id="1030" name="Picture 6">
+            <a:extLst>
+              <a:ext uri="{FF2B5EF4-FFF2-40B4-BE49-F238E27FC236}">
+                <a16:creationId xmlns:a16="http://schemas.microsoft.com/office/drawing/2014/main" id="{607FD988-E0AC-8CAE-76F6-3F0F8782AEE3}"/>
+              </a:ext>
+            </a:extLst>
+          </p:cNvPr>
+          <p:cNvPicPr>
+            <a:picLocks noChangeAspect="1" noChangeArrowheads="1"/>
+          </p:cNvPicPr>
+          <p:nvPr/>
+        </p:nvPicPr>
+        <p:blipFill>
+          <a:blip r:embed="rId5">
+            <a:extLst>
+              <a:ext uri="{28A0092B-C50C-407E-A947-70E740481C1C}">
+                <a14:useLocalDpi xmlns:a14="http://schemas.microsoft.com/office/drawing/2010/main" val="0"/>
+              </a:ext>
+            </a:extLst>
+          </a:blip>
+          <a:srcRect/>
+          <a:stretch>
+            <a:fillRect/>
+          </a:stretch>
+        </p:blipFill>
+        <p:spPr bwMode="auto">
+          <a:xfrm>
+            <a:off x="9373264" y="1121258"/>
+            <a:ext cx="2306029" cy="5124509"/>
+          </a:xfrm>
+          <a:prstGeom prst="rect">
+            <a:avLst/>
+          </a:prstGeom>
+          <a:noFill/>
+          <a:ln>
+            <a:solidFill>
+              <a:schemeClr val="tx1"/>
+            </a:solidFill>
+          </a:ln>
+          <a:extLst>
+            <a:ext uri="{909E8E84-426E-40DD-AFC4-6F175D3DCCD1}">
+              <a14:hiddenFill xmlns:a14="http://schemas.microsoft.com/office/drawing/2010/main">
+                <a:solidFill>
+                  <a:srgbClr val="FFFFFF"/>
+                </a:solidFill>
+              </a14:hiddenFill>
+            </a:ext>
+          </a:extLst>
+        </p:spPr>
+      </p:pic>
     </p:spTree>
     <p:extLst>
       <p:ext uri="{BB962C8B-B14F-4D97-AF65-F5344CB8AC3E}">
@@ -17749,25 +17928,6 @@
 </file>
 
 <file path=customXml/item2.xml><?xml version="1.0" encoding="utf-8"?>
-<p:properties xmlns:p="http://schemas.microsoft.com/office/2006/metadata/properties" xmlns:xsi="http://www.w3.org/2001/XMLSchema-instance" xmlns:pc="http://schemas.microsoft.com/office/infopath/2007/PartnerControls">
-  <documentManagement>
-    <_ip_UnifiedCompliancePolicyUIAction xmlns="http://schemas.microsoft.com/sharepoint/v3" xsi:nil="true"/>
-    <Image xmlns="71af3243-3dd4-4a8d-8c0d-dd76da1f02a5">
-      <Url xsi:nil="true"/>
-      <Description xsi:nil="true"/>
-    </Image>
-    <Status xmlns="71af3243-3dd4-4a8d-8c0d-dd76da1f02a5">Not started</Status>
-    <_ip_UnifiedCompliancePolicyProperties xmlns="http://schemas.microsoft.com/sharepoint/v3" xsi:nil="true"/>
-    <ImageTagsTaxHTField xmlns="71af3243-3dd4-4a8d-8c0d-dd76da1f02a5">
-      <Terms xmlns="http://schemas.microsoft.com/office/infopath/2007/PartnerControls"/>
-    </ImageTagsTaxHTField>
-    <TaxCatchAll xmlns="230e9df3-be65-4c73-a93b-d1236ebd677e"/>
-    <MediaServiceKeyPoints xmlns="71af3243-3dd4-4a8d-8c0d-dd76da1f02a5" xsi:nil="true"/>
-  </documentManagement>
-</p:properties>
-</file>
-
-<file path=customXml/item3.xml><?xml version="1.0" encoding="utf-8"?>
 <ct:contentTypeSchema xmlns:ct="http://schemas.microsoft.com/office/2006/metadata/contentType" xmlns:ma="http://schemas.microsoft.com/office/2006/metadata/properties/metaAttributes" ct:_="" ma:_="" ma:contentTypeName="Document" ma:contentTypeID="0x01010079F111ED35F8CC479449609E8A0923A6" ma:contentTypeVersion="20" ma:contentTypeDescription="Create a new document." ma:contentTypeScope="" ma:versionID="1267097ee5f5874adfcc408041ae252e">
   <xsd:schema xmlns:xsd="http://www.w3.org/2001/XMLSchema" xmlns:xs="http://www.w3.org/2001/XMLSchema" xmlns:p="http://schemas.microsoft.com/office/2006/metadata/properties" xmlns:ns1="http://schemas.microsoft.com/sharepoint/v3" xmlns:ns2="71af3243-3dd4-4a8d-8c0d-dd76da1f02a5" xmlns:ns3="16c05727-aa75-4e4a-9b5f-8a80a1165891" xmlns:ns4="230e9df3-be65-4c73-a93b-d1236ebd677e" targetNamespace="http://schemas.microsoft.com/office/2006/metadata/properties" ma:root="true" ma:fieldsID="395891a93df65b14727750f2c06c306c" ns1:_="" ns2:_="" ns3:_="" ns4:_="">
     <xsd:import namespace="http://schemas.microsoft.com/sharepoint/v3"/>
@@ -18043,6 +18203,25 @@
 </ct:contentTypeSchema>
 </file>
 
+<file path=customXml/item3.xml><?xml version="1.0" encoding="utf-8"?>
+<p:properties xmlns:p="http://schemas.microsoft.com/office/2006/metadata/properties" xmlns:xsi="http://www.w3.org/2001/XMLSchema-instance" xmlns:pc="http://schemas.microsoft.com/office/infopath/2007/PartnerControls">
+  <documentManagement>
+    <_ip_UnifiedCompliancePolicyUIAction xmlns="http://schemas.microsoft.com/sharepoint/v3" xsi:nil="true"/>
+    <Image xmlns="71af3243-3dd4-4a8d-8c0d-dd76da1f02a5">
+      <Url xsi:nil="true"/>
+      <Description xsi:nil="true"/>
+    </Image>
+    <Status xmlns="71af3243-3dd4-4a8d-8c0d-dd76da1f02a5">Not started</Status>
+    <_ip_UnifiedCompliancePolicyProperties xmlns="http://schemas.microsoft.com/sharepoint/v3" xsi:nil="true"/>
+    <ImageTagsTaxHTField xmlns="71af3243-3dd4-4a8d-8c0d-dd76da1f02a5">
+      <Terms xmlns="http://schemas.microsoft.com/office/infopath/2007/PartnerControls"/>
+    </ImageTagsTaxHTField>
+    <TaxCatchAll xmlns="230e9df3-be65-4c73-a93b-d1236ebd677e"/>
+    <MediaServiceKeyPoints xmlns="71af3243-3dd4-4a8d-8c0d-dd76da1f02a5" xsi:nil="true"/>
+  </documentManagement>
+</p:properties>
+</file>
+
 <file path=customXml/itemProps1.xml><?xml version="1.0" encoding="utf-8"?>
 <ds:datastoreItem xmlns:ds="http://schemas.openxmlformats.org/officeDocument/2006/customXml" ds:itemID="{42BC90D6-94CF-42F7-AAC4-9CF6824C54D5}">
   <ds:schemaRefs>
@@ -18052,18 +18231,6 @@
 </file>
 
 <file path=customXml/itemProps2.xml><?xml version="1.0" encoding="utf-8"?>
-<ds:datastoreItem xmlns:ds="http://schemas.openxmlformats.org/officeDocument/2006/customXml" ds:itemID="{7F97B18F-50BC-4F30-8373-93489E845F83}">
-  <ds:schemaRefs>
-    <ds:schemaRef ds:uri="http://schemas.microsoft.com/office/2006/metadata/properties"/>
-    <ds:schemaRef ds:uri="http://schemas.microsoft.com/office/infopath/2007/PartnerControls"/>
-    <ds:schemaRef ds:uri="http://schemas.microsoft.com/sharepoint/v3"/>
-    <ds:schemaRef ds:uri="71af3243-3dd4-4a8d-8c0d-dd76da1f02a5"/>
-    <ds:schemaRef ds:uri="230e9df3-be65-4c73-a93b-d1236ebd677e"/>
-  </ds:schemaRefs>
-</ds:datastoreItem>
-</file>
-
-<file path=customXml/itemProps3.xml><?xml version="1.0" encoding="utf-8"?>
 <ds:datastoreItem xmlns:ds="http://schemas.openxmlformats.org/officeDocument/2006/customXml" ds:itemID="{64CF2EF3-001F-4BE9-81B3-86ECBBF9425F}">
   <ds:schemaRefs>
     <ds:schemaRef ds:uri="http://schemas.microsoft.com/office/2006/metadata/contentType"/>
@@ -18084,6 +18251,25 @@
 </ds:datastoreItem>
 </file>
 
+<file path=customXml/itemProps3.xml><?xml version="1.0" encoding="utf-8"?>
+<ds:datastoreItem xmlns:ds="http://schemas.openxmlformats.org/officeDocument/2006/customXml" ds:itemID="{7F97B18F-50BC-4F30-8373-93489E845F83}">
+  <ds:schemaRefs>
+    <ds:schemaRef ds:uri="http://schemas.microsoft.com/sharepoint/v3"/>
+    <ds:schemaRef ds:uri="http://schemas.microsoft.com/office/2006/documentManagement/types"/>
+    <ds:schemaRef ds:uri="http://purl.org/dc/terms/"/>
+    <ds:schemaRef ds:uri="230e9df3-be65-4c73-a93b-d1236ebd677e"/>
+    <ds:schemaRef ds:uri="16c05727-aa75-4e4a-9b5f-8a80a1165891"/>
+    <ds:schemaRef ds:uri="http://purl.org/dc/dcmitype/"/>
+    <ds:schemaRef ds:uri="http://schemas.microsoft.com/office/infopath/2007/PartnerControls"/>
+    <ds:schemaRef ds:uri="http://purl.org/dc/elements/1.1/"/>
+    <ds:schemaRef ds:uri="http://schemas.microsoft.com/office/2006/metadata/properties"/>
+    <ds:schemaRef ds:uri="http://schemas.openxmlformats.org/package/2006/metadata/core-properties"/>
+    <ds:schemaRef ds:uri="71af3243-3dd4-4a8d-8c0d-dd76da1f02a5"/>
+    <ds:schemaRef ds:uri="http://www.w3.org/XML/1998/namespace"/>
+  </ds:schemaRefs>
+</ds:datastoreItem>
+</file>
+
 <file path=docMetadata/LabelInfo.xml><?xml version="1.0" encoding="utf-8"?>
 <clbl:labelList xmlns:clbl="http://schemas.microsoft.com/office/2020/mipLabelMetadata">
   <clbl:label id="{f42aa342-8706-4288-bd11-ebb85995028c}" enabled="1" method="Standard" siteId="{72f988bf-86f1-41af-91ab-2d7cd011db47}" removed="0"/>

</xml_diff>

<commit_message>
mobile design exercise update
</commit_message>
<xml_diff>
--- a/Mobile Programming and Multimedia/Exercises/2023-2024/Exercise-2/Amista_Sanson_Mobile_Design.pptx
+++ b/Mobile Programming and Multimedia/Exercises/2023-2024/Exercise-2/Amista_Sanson_Mobile_Design.pptx
@@ -242,7 +242,7 @@
             <a:pPr rtl="0"/>
             <a:fld id="{DBC54730-5EBA-4920-A6C4-7F8458A7F940}" type="datetime1">
               <a:rPr lang="it-IT" smtClean="0"/>
-              <a:t>28/04/2024</a:t>
+              <a:t>29/04/2024</a:t>
             </a:fld>
             <a:endParaRPr lang="it-IT"/>
           </a:p>
@@ -424,7 +424,7 @@
             <a:fld id="{85EC1C34-318D-43A8-83F5-3AC8647FE75E}" type="datetime1">
               <a:rPr lang="it-IT" smtClean="0"/>
               <a:pPr/>
-              <a:t>28/04/2024</a:t>
+              <a:t>29/04/2024</a:t>
             </a:fld>
             <a:endParaRPr lang="it-IT" dirty="0"/>
           </a:p>
@@ -16584,7 +16584,7 @@
         <p:spPr>
           <a:xfrm>
             <a:off x="644362" y="990476"/>
-            <a:ext cx="3258335" cy="5622052"/>
+            <a:ext cx="3430753" cy="5622052"/>
           </a:xfrm>
           <a:prstGeom prst="rect">
             <a:avLst/>
@@ -16684,7 +16684,7 @@
             </a:pPr>
             <a:r>
               <a:rPr lang="en-GB" dirty="0"/>
-              <a:t>use buttons to provide carousel information</a:t>
+              <a:t>provide carousel information using another approach</a:t>
             </a:r>
           </a:p>
           <a:p>
@@ -16710,7 +16710,7 @@
             </a:pPr>
             <a:r>
               <a:rPr lang="en-GB" dirty="0"/>
-              <a:t>include the bottom menu across all pages</a:t>
+              <a:t>include the bottom menu on all pages</a:t>
             </a:r>
           </a:p>
           <a:p>
@@ -16917,7 +16917,7 @@
             </a:pPr>
             <a:r>
               <a:rPr lang="en-GB" dirty="0"/>
-              <a:t>Follows the principle: “content on top”</a:t>
+              <a:t>follows the principle: “content on top”</a:t>
             </a:r>
           </a:p>
           <a:p>
@@ -16930,7 +16930,7 @@
             </a:pPr>
             <a:r>
               <a:rPr lang="en-GB" dirty="0"/>
-              <a:t>Just-in-time interfaces</a:t>
+              <a:t>just-in-time interfaces</a:t>
             </a:r>
           </a:p>
           <a:p>
@@ -16943,7 +16943,7 @@
             </a:pPr>
             <a:r>
               <a:rPr lang="en-GB" dirty="0"/>
-              <a:t>Gestures</a:t>
+              <a:t>gestures</a:t>
             </a:r>
           </a:p>
           <a:p>
@@ -17928,6 +17928,25 @@
 </file>
 
 <file path=customXml/item2.xml><?xml version="1.0" encoding="utf-8"?>
+<p:properties xmlns:p="http://schemas.microsoft.com/office/2006/metadata/properties" xmlns:xsi="http://www.w3.org/2001/XMLSchema-instance" xmlns:pc="http://schemas.microsoft.com/office/infopath/2007/PartnerControls">
+  <documentManagement>
+    <_ip_UnifiedCompliancePolicyUIAction xmlns="http://schemas.microsoft.com/sharepoint/v3" xsi:nil="true"/>
+    <Image xmlns="71af3243-3dd4-4a8d-8c0d-dd76da1f02a5">
+      <Url xsi:nil="true"/>
+      <Description xsi:nil="true"/>
+    </Image>
+    <Status xmlns="71af3243-3dd4-4a8d-8c0d-dd76da1f02a5">Not started</Status>
+    <_ip_UnifiedCompliancePolicyProperties xmlns="http://schemas.microsoft.com/sharepoint/v3" xsi:nil="true"/>
+    <ImageTagsTaxHTField xmlns="71af3243-3dd4-4a8d-8c0d-dd76da1f02a5">
+      <Terms xmlns="http://schemas.microsoft.com/office/infopath/2007/PartnerControls"/>
+    </ImageTagsTaxHTField>
+    <TaxCatchAll xmlns="230e9df3-be65-4c73-a93b-d1236ebd677e"/>
+    <MediaServiceKeyPoints xmlns="71af3243-3dd4-4a8d-8c0d-dd76da1f02a5" xsi:nil="true"/>
+  </documentManagement>
+</p:properties>
+</file>
+
+<file path=customXml/item3.xml><?xml version="1.0" encoding="utf-8"?>
 <ct:contentTypeSchema xmlns:ct="http://schemas.microsoft.com/office/2006/metadata/contentType" xmlns:ma="http://schemas.microsoft.com/office/2006/metadata/properties/metaAttributes" ct:_="" ma:_="" ma:contentTypeName="Document" ma:contentTypeID="0x01010079F111ED35F8CC479449609E8A0923A6" ma:contentTypeVersion="20" ma:contentTypeDescription="Create a new document." ma:contentTypeScope="" ma:versionID="1267097ee5f5874adfcc408041ae252e">
   <xsd:schema xmlns:xsd="http://www.w3.org/2001/XMLSchema" xmlns:xs="http://www.w3.org/2001/XMLSchema" xmlns:p="http://schemas.microsoft.com/office/2006/metadata/properties" xmlns:ns1="http://schemas.microsoft.com/sharepoint/v3" xmlns:ns2="71af3243-3dd4-4a8d-8c0d-dd76da1f02a5" xmlns:ns3="16c05727-aa75-4e4a-9b5f-8a80a1165891" xmlns:ns4="230e9df3-be65-4c73-a93b-d1236ebd677e" targetNamespace="http://schemas.microsoft.com/office/2006/metadata/properties" ma:root="true" ma:fieldsID="395891a93df65b14727750f2c06c306c" ns1:_="" ns2:_="" ns3:_="" ns4:_="">
     <xsd:import namespace="http://schemas.microsoft.com/sharepoint/v3"/>
@@ -18203,25 +18222,6 @@
 </ct:contentTypeSchema>
 </file>
 
-<file path=customXml/item3.xml><?xml version="1.0" encoding="utf-8"?>
-<p:properties xmlns:p="http://schemas.microsoft.com/office/2006/metadata/properties" xmlns:xsi="http://www.w3.org/2001/XMLSchema-instance" xmlns:pc="http://schemas.microsoft.com/office/infopath/2007/PartnerControls">
-  <documentManagement>
-    <_ip_UnifiedCompliancePolicyUIAction xmlns="http://schemas.microsoft.com/sharepoint/v3" xsi:nil="true"/>
-    <Image xmlns="71af3243-3dd4-4a8d-8c0d-dd76da1f02a5">
-      <Url xsi:nil="true"/>
-      <Description xsi:nil="true"/>
-    </Image>
-    <Status xmlns="71af3243-3dd4-4a8d-8c0d-dd76da1f02a5">Not started</Status>
-    <_ip_UnifiedCompliancePolicyProperties xmlns="http://schemas.microsoft.com/sharepoint/v3" xsi:nil="true"/>
-    <ImageTagsTaxHTField xmlns="71af3243-3dd4-4a8d-8c0d-dd76da1f02a5">
-      <Terms xmlns="http://schemas.microsoft.com/office/infopath/2007/PartnerControls"/>
-    </ImageTagsTaxHTField>
-    <TaxCatchAll xmlns="230e9df3-be65-4c73-a93b-d1236ebd677e"/>
-    <MediaServiceKeyPoints xmlns="71af3243-3dd4-4a8d-8c0d-dd76da1f02a5" xsi:nil="true"/>
-  </documentManagement>
-</p:properties>
-</file>
-
 <file path=customXml/itemProps1.xml><?xml version="1.0" encoding="utf-8"?>
 <ds:datastoreItem xmlns:ds="http://schemas.openxmlformats.org/officeDocument/2006/customXml" ds:itemID="{42BC90D6-94CF-42F7-AAC4-9CF6824C54D5}">
   <ds:schemaRefs>
@@ -18231,6 +18231,25 @@
 </file>
 
 <file path=customXml/itemProps2.xml><?xml version="1.0" encoding="utf-8"?>
+<ds:datastoreItem xmlns:ds="http://schemas.openxmlformats.org/officeDocument/2006/customXml" ds:itemID="{7F97B18F-50BC-4F30-8373-93489E845F83}">
+  <ds:schemaRefs>
+    <ds:schemaRef ds:uri="http://schemas.microsoft.com/sharepoint/v3"/>
+    <ds:schemaRef ds:uri="http://schemas.microsoft.com/office/2006/documentManagement/types"/>
+    <ds:schemaRef ds:uri="http://purl.org/dc/terms/"/>
+    <ds:schemaRef ds:uri="230e9df3-be65-4c73-a93b-d1236ebd677e"/>
+    <ds:schemaRef ds:uri="16c05727-aa75-4e4a-9b5f-8a80a1165891"/>
+    <ds:schemaRef ds:uri="http://purl.org/dc/dcmitype/"/>
+    <ds:schemaRef ds:uri="http://schemas.microsoft.com/office/infopath/2007/PartnerControls"/>
+    <ds:schemaRef ds:uri="http://purl.org/dc/elements/1.1/"/>
+    <ds:schemaRef ds:uri="http://schemas.microsoft.com/office/2006/metadata/properties"/>
+    <ds:schemaRef ds:uri="http://schemas.openxmlformats.org/package/2006/metadata/core-properties"/>
+    <ds:schemaRef ds:uri="71af3243-3dd4-4a8d-8c0d-dd76da1f02a5"/>
+    <ds:schemaRef ds:uri="http://www.w3.org/XML/1998/namespace"/>
+  </ds:schemaRefs>
+</ds:datastoreItem>
+</file>
+
+<file path=customXml/itemProps3.xml><?xml version="1.0" encoding="utf-8"?>
 <ds:datastoreItem xmlns:ds="http://schemas.openxmlformats.org/officeDocument/2006/customXml" ds:itemID="{64CF2EF3-001F-4BE9-81B3-86ECBBF9425F}">
   <ds:schemaRefs>
     <ds:schemaRef ds:uri="http://schemas.microsoft.com/office/2006/metadata/contentType"/>
@@ -18251,25 +18270,6 @@
 </ds:datastoreItem>
 </file>
 
-<file path=customXml/itemProps3.xml><?xml version="1.0" encoding="utf-8"?>
-<ds:datastoreItem xmlns:ds="http://schemas.openxmlformats.org/officeDocument/2006/customXml" ds:itemID="{7F97B18F-50BC-4F30-8373-93489E845F83}">
-  <ds:schemaRefs>
-    <ds:schemaRef ds:uri="http://schemas.microsoft.com/sharepoint/v3"/>
-    <ds:schemaRef ds:uri="http://schemas.microsoft.com/office/2006/documentManagement/types"/>
-    <ds:schemaRef ds:uri="http://purl.org/dc/terms/"/>
-    <ds:schemaRef ds:uri="230e9df3-be65-4c73-a93b-d1236ebd677e"/>
-    <ds:schemaRef ds:uri="16c05727-aa75-4e4a-9b5f-8a80a1165891"/>
-    <ds:schemaRef ds:uri="http://purl.org/dc/dcmitype/"/>
-    <ds:schemaRef ds:uri="http://schemas.microsoft.com/office/infopath/2007/PartnerControls"/>
-    <ds:schemaRef ds:uri="http://purl.org/dc/elements/1.1/"/>
-    <ds:schemaRef ds:uri="http://schemas.microsoft.com/office/2006/metadata/properties"/>
-    <ds:schemaRef ds:uri="http://schemas.openxmlformats.org/package/2006/metadata/core-properties"/>
-    <ds:schemaRef ds:uri="71af3243-3dd4-4a8d-8c0d-dd76da1f02a5"/>
-    <ds:schemaRef ds:uri="http://www.w3.org/XML/1998/namespace"/>
-  </ds:schemaRefs>
-</ds:datastoreItem>
-</file>
-
 <file path=docMetadata/LabelInfo.xml><?xml version="1.0" encoding="utf-8"?>
 <clbl:labelList xmlns:clbl="http://schemas.microsoft.com/office/2020/mipLabelMetadata">
   <clbl:label id="{f42aa342-8706-4288-bd11-ebb85995028c}" enabled="1" method="Standard" siteId="{72f988bf-86f1-41af-91ab-2d7cd011db47}" removed="0"/>

</xml_diff>

<commit_message>
mobile design final version
</commit_message>
<xml_diff>
--- a/Mobile Programming and Multimedia/Exercises/2023-2024/Exercise-2/Amista_Sanson_Mobile_Design.pptx
+++ b/Mobile Programming and Multimedia/Exercises/2023-2024/Exercise-2/Amista_Sanson_Mobile_Design.pptx
@@ -16884,7 +16884,7 @@
         <p:spPr>
           <a:xfrm>
             <a:off x="644362" y="990476"/>
-            <a:ext cx="3258335" cy="2100575"/>
+            <a:ext cx="3258335" cy="2757165"/>
           </a:xfrm>
           <a:prstGeom prst="rect">
             <a:avLst/>
@@ -16918,6 +16918,19 @@
             <a:r>
               <a:rPr lang="en-GB" dirty="0"/>
               <a:t>follows the principle: “content on top”</a:t>
+            </a:r>
+          </a:p>
+          <a:p>
+            <a:pPr marL="285750" indent="-285750">
+              <a:spcAft>
+                <a:spcPts val="800"/>
+              </a:spcAft>
+              <a:buFontTx/>
+              <a:buChar char="-"/>
+            </a:pPr>
+            <a:r>
+              <a:rPr lang="en-GB" dirty="0"/>
+              <a:t>tool bar on the bottom (following iOS guidelines)</a:t>
             </a:r>
           </a:p>
           <a:p>
@@ -17928,25 +17941,6 @@
 </file>
 
 <file path=customXml/item2.xml><?xml version="1.0" encoding="utf-8"?>
-<p:properties xmlns:p="http://schemas.microsoft.com/office/2006/metadata/properties" xmlns:xsi="http://www.w3.org/2001/XMLSchema-instance" xmlns:pc="http://schemas.microsoft.com/office/infopath/2007/PartnerControls">
-  <documentManagement>
-    <_ip_UnifiedCompliancePolicyUIAction xmlns="http://schemas.microsoft.com/sharepoint/v3" xsi:nil="true"/>
-    <Image xmlns="71af3243-3dd4-4a8d-8c0d-dd76da1f02a5">
-      <Url xsi:nil="true"/>
-      <Description xsi:nil="true"/>
-    </Image>
-    <Status xmlns="71af3243-3dd4-4a8d-8c0d-dd76da1f02a5">Not started</Status>
-    <_ip_UnifiedCompliancePolicyProperties xmlns="http://schemas.microsoft.com/sharepoint/v3" xsi:nil="true"/>
-    <ImageTagsTaxHTField xmlns="71af3243-3dd4-4a8d-8c0d-dd76da1f02a5">
-      <Terms xmlns="http://schemas.microsoft.com/office/infopath/2007/PartnerControls"/>
-    </ImageTagsTaxHTField>
-    <TaxCatchAll xmlns="230e9df3-be65-4c73-a93b-d1236ebd677e"/>
-    <MediaServiceKeyPoints xmlns="71af3243-3dd4-4a8d-8c0d-dd76da1f02a5" xsi:nil="true"/>
-  </documentManagement>
-</p:properties>
-</file>
-
-<file path=customXml/item3.xml><?xml version="1.0" encoding="utf-8"?>
 <ct:contentTypeSchema xmlns:ct="http://schemas.microsoft.com/office/2006/metadata/contentType" xmlns:ma="http://schemas.microsoft.com/office/2006/metadata/properties/metaAttributes" ct:_="" ma:_="" ma:contentTypeName="Document" ma:contentTypeID="0x01010079F111ED35F8CC479449609E8A0923A6" ma:contentTypeVersion="20" ma:contentTypeDescription="Create a new document." ma:contentTypeScope="" ma:versionID="1267097ee5f5874adfcc408041ae252e">
   <xsd:schema xmlns:xsd="http://www.w3.org/2001/XMLSchema" xmlns:xs="http://www.w3.org/2001/XMLSchema" xmlns:p="http://schemas.microsoft.com/office/2006/metadata/properties" xmlns:ns1="http://schemas.microsoft.com/sharepoint/v3" xmlns:ns2="71af3243-3dd4-4a8d-8c0d-dd76da1f02a5" xmlns:ns3="16c05727-aa75-4e4a-9b5f-8a80a1165891" xmlns:ns4="230e9df3-be65-4c73-a93b-d1236ebd677e" targetNamespace="http://schemas.microsoft.com/office/2006/metadata/properties" ma:root="true" ma:fieldsID="395891a93df65b14727750f2c06c306c" ns1:_="" ns2:_="" ns3:_="" ns4:_="">
     <xsd:import namespace="http://schemas.microsoft.com/sharepoint/v3"/>
@@ -18222,6 +18216,25 @@
 </ct:contentTypeSchema>
 </file>
 
+<file path=customXml/item3.xml><?xml version="1.0" encoding="utf-8"?>
+<p:properties xmlns:p="http://schemas.microsoft.com/office/2006/metadata/properties" xmlns:xsi="http://www.w3.org/2001/XMLSchema-instance" xmlns:pc="http://schemas.microsoft.com/office/infopath/2007/PartnerControls">
+  <documentManagement>
+    <_ip_UnifiedCompliancePolicyUIAction xmlns="http://schemas.microsoft.com/sharepoint/v3" xsi:nil="true"/>
+    <Image xmlns="71af3243-3dd4-4a8d-8c0d-dd76da1f02a5">
+      <Url xsi:nil="true"/>
+      <Description xsi:nil="true"/>
+    </Image>
+    <Status xmlns="71af3243-3dd4-4a8d-8c0d-dd76da1f02a5">Not started</Status>
+    <_ip_UnifiedCompliancePolicyProperties xmlns="http://schemas.microsoft.com/sharepoint/v3" xsi:nil="true"/>
+    <ImageTagsTaxHTField xmlns="71af3243-3dd4-4a8d-8c0d-dd76da1f02a5">
+      <Terms xmlns="http://schemas.microsoft.com/office/infopath/2007/PartnerControls"/>
+    </ImageTagsTaxHTField>
+    <TaxCatchAll xmlns="230e9df3-be65-4c73-a93b-d1236ebd677e"/>
+    <MediaServiceKeyPoints xmlns="71af3243-3dd4-4a8d-8c0d-dd76da1f02a5" xsi:nil="true"/>
+  </documentManagement>
+</p:properties>
+</file>
+
 <file path=customXml/itemProps1.xml><?xml version="1.0" encoding="utf-8"?>
 <ds:datastoreItem xmlns:ds="http://schemas.openxmlformats.org/officeDocument/2006/customXml" ds:itemID="{42BC90D6-94CF-42F7-AAC4-9CF6824C54D5}">
   <ds:schemaRefs>
@@ -18231,25 +18244,6 @@
 </file>
 
 <file path=customXml/itemProps2.xml><?xml version="1.0" encoding="utf-8"?>
-<ds:datastoreItem xmlns:ds="http://schemas.openxmlformats.org/officeDocument/2006/customXml" ds:itemID="{7F97B18F-50BC-4F30-8373-93489E845F83}">
-  <ds:schemaRefs>
-    <ds:schemaRef ds:uri="http://schemas.microsoft.com/sharepoint/v3"/>
-    <ds:schemaRef ds:uri="http://schemas.microsoft.com/office/2006/documentManagement/types"/>
-    <ds:schemaRef ds:uri="http://purl.org/dc/terms/"/>
-    <ds:schemaRef ds:uri="230e9df3-be65-4c73-a93b-d1236ebd677e"/>
-    <ds:schemaRef ds:uri="16c05727-aa75-4e4a-9b5f-8a80a1165891"/>
-    <ds:schemaRef ds:uri="http://purl.org/dc/dcmitype/"/>
-    <ds:schemaRef ds:uri="http://schemas.microsoft.com/office/infopath/2007/PartnerControls"/>
-    <ds:schemaRef ds:uri="http://purl.org/dc/elements/1.1/"/>
-    <ds:schemaRef ds:uri="http://schemas.microsoft.com/office/2006/metadata/properties"/>
-    <ds:schemaRef ds:uri="http://schemas.openxmlformats.org/package/2006/metadata/core-properties"/>
-    <ds:schemaRef ds:uri="71af3243-3dd4-4a8d-8c0d-dd76da1f02a5"/>
-    <ds:schemaRef ds:uri="http://www.w3.org/XML/1998/namespace"/>
-  </ds:schemaRefs>
-</ds:datastoreItem>
-</file>
-
-<file path=customXml/itemProps3.xml><?xml version="1.0" encoding="utf-8"?>
 <ds:datastoreItem xmlns:ds="http://schemas.openxmlformats.org/officeDocument/2006/customXml" ds:itemID="{64CF2EF3-001F-4BE9-81B3-86ECBBF9425F}">
   <ds:schemaRefs>
     <ds:schemaRef ds:uri="http://schemas.microsoft.com/office/2006/metadata/contentType"/>
@@ -18270,6 +18264,25 @@
 </ds:datastoreItem>
 </file>
 
+<file path=customXml/itemProps3.xml><?xml version="1.0" encoding="utf-8"?>
+<ds:datastoreItem xmlns:ds="http://schemas.openxmlformats.org/officeDocument/2006/customXml" ds:itemID="{7F97B18F-50BC-4F30-8373-93489E845F83}">
+  <ds:schemaRefs>
+    <ds:schemaRef ds:uri="http://schemas.microsoft.com/sharepoint/v3"/>
+    <ds:schemaRef ds:uri="http://schemas.microsoft.com/office/2006/documentManagement/types"/>
+    <ds:schemaRef ds:uri="http://purl.org/dc/terms/"/>
+    <ds:schemaRef ds:uri="16c05727-aa75-4e4a-9b5f-8a80a1165891"/>
+    <ds:schemaRef ds:uri="http://purl.org/dc/dcmitype/"/>
+    <ds:schemaRef ds:uri="http://purl.org/dc/elements/1.1/"/>
+    <ds:schemaRef ds:uri="http://schemas.microsoft.com/office/2006/metadata/properties"/>
+    <ds:schemaRef ds:uri="http://schemas.microsoft.com/office/infopath/2007/PartnerControls"/>
+    <ds:schemaRef ds:uri="230e9df3-be65-4c73-a93b-d1236ebd677e"/>
+    <ds:schemaRef ds:uri="http://schemas.openxmlformats.org/package/2006/metadata/core-properties"/>
+    <ds:schemaRef ds:uri="71af3243-3dd4-4a8d-8c0d-dd76da1f02a5"/>
+    <ds:schemaRef ds:uri="http://www.w3.org/XML/1998/namespace"/>
+  </ds:schemaRefs>
+</ds:datastoreItem>
+</file>
+
 <file path=docMetadata/LabelInfo.xml><?xml version="1.0" encoding="utf-8"?>
 <clbl:labelList xmlns:clbl="http://schemas.microsoft.com/office/2020/mipLabelMetadata">
   <clbl:label id="{f42aa342-8706-4288-bd11-ebb85995028c}" enabled="1" method="Standard" siteId="{72f988bf-86f1-41af-91ab-2d7cd011db47}" removed="0"/>

</xml_diff>